<commit_message>
VJ 140609 latest changes, using git properly now
</commit_message>
<xml_diff>
--- a/install/nutshell.pptx
+++ b/install/nutshell.pptx
@@ -4,6 +4,9 @@
   <p:sldMasterIdLst>
     <p:sldMasterId id="2147483648" r:id="rId1"/>
   </p:sldMasterIdLst>
+  <p:notesMasterIdLst>
+    <p:notesMasterId r:id="rId3"/>
+  </p:notesMasterIdLst>
   <p:sldIdLst>
     <p:sldId id="257" r:id="rId2"/>
   </p:sldIdLst>
@@ -107,6 +110,440 @@
 </p:presentation>
 </file>
 
+<file path=ppt/notesMasters/notesMaster1.xml><?xml version="1.0" encoding="utf-8"?>
+<p:notesMaster xmlns:a="http://schemas.openxmlformats.org/drawingml/2006/main" xmlns:r="http://schemas.openxmlformats.org/officeDocument/2006/relationships" xmlns:p="http://schemas.openxmlformats.org/presentationml/2006/main">
+  <p:cSld>
+    <p:bg>
+      <p:bgRef idx="1001">
+        <a:schemeClr val="bg1"/>
+      </p:bgRef>
+    </p:bg>
+    <p:spTree>
+      <p:nvGrpSpPr>
+        <p:cNvPr id="1" name=""/>
+        <p:cNvGrpSpPr/>
+        <p:nvPr/>
+      </p:nvGrpSpPr>
+      <p:grpSpPr>
+        <a:xfrm>
+          <a:off x="0" y="0"/>
+          <a:ext cx="0" cy="0"/>
+          <a:chOff x="0" y="0"/>
+          <a:chExt cx="0" cy="0"/>
+        </a:xfrm>
+      </p:grpSpPr>
+      <p:sp>
+        <p:nvSpPr>
+          <p:cNvPr id="2" name="Header Placeholder 1"/>
+          <p:cNvSpPr>
+            <a:spLocks noGrp="1"/>
+          </p:cNvSpPr>
+          <p:nvPr>
+            <p:ph type="hdr" sz="quarter"/>
+          </p:nvPr>
+        </p:nvSpPr>
+        <p:spPr>
+          <a:xfrm>
+            <a:off x="0" y="0"/>
+            <a:ext cx="2971800" cy="457200"/>
+          </a:xfrm>
+          <a:prstGeom prst="rect">
+            <a:avLst/>
+          </a:prstGeom>
+        </p:spPr>
+        <p:txBody>
+          <a:bodyPr vert="horz" lIns="91440" tIns="45720" rIns="91440" bIns="45720" rtlCol="0"/>
+          <a:lstStyle>
+            <a:lvl1pPr algn="l">
+              <a:defRPr sz="1200"/>
+            </a:lvl1pPr>
+          </a:lstStyle>
+          <a:p>
+            <a:endParaRPr lang="en-US"/>
+          </a:p>
+        </p:txBody>
+      </p:sp>
+      <p:sp>
+        <p:nvSpPr>
+          <p:cNvPr id="3" name="Date Placeholder 2"/>
+          <p:cNvSpPr>
+            <a:spLocks noGrp="1"/>
+          </p:cNvSpPr>
+          <p:nvPr>
+            <p:ph type="dt" idx="1"/>
+          </p:nvPr>
+        </p:nvSpPr>
+        <p:spPr>
+          <a:xfrm>
+            <a:off x="3884613" y="0"/>
+            <a:ext cx="2971800" cy="457200"/>
+          </a:xfrm>
+          <a:prstGeom prst="rect">
+            <a:avLst/>
+          </a:prstGeom>
+        </p:spPr>
+        <p:txBody>
+          <a:bodyPr vert="horz" lIns="91440" tIns="45720" rIns="91440" bIns="45720" rtlCol="0"/>
+          <a:lstStyle>
+            <a:lvl1pPr algn="r">
+              <a:defRPr sz="1200"/>
+            </a:lvl1pPr>
+          </a:lstStyle>
+          <a:p>
+            <a:fld id="{342C59F0-A296-4EFD-8A4B-06D50F7F91F3}" type="datetimeFigureOut">
+              <a:rPr lang="en-US" smtClean="0"/>
+              <a:t>2/22/2014</a:t>
+            </a:fld>
+            <a:endParaRPr lang="en-US"/>
+          </a:p>
+        </p:txBody>
+      </p:sp>
+      <p:sp>
+        <p:nvSpPr>
+          <p:cNvPr id="4" name="Slide Image Placeholder 3"/>
+          <p:cNvSpPr>
+            <a:spLocks noGrp="1" noRot="1" noChangeAspect="1"/>
+          </p:cNvSpPr>
+          <p:nvPr>
+            <p:ph type="sldImg" idx="2"/>
+          </p:nvPr>
+        </p:nvSpPr>
+        <p:spPr>
+          <a:xfrm>
+            <a:off x="1143000" y="685800"/>
+            <a:ext cx="4572000" cy="3429000"/>
+          </a:xfrm>
+          <a:prstGeom prst="rect">
+            <a:avLst/>
+          </a:prstGeom>
+          <a:noFill/>
+          <a:ln w="12700">
+            <a:solidFill>
+              <a:prstClr val="black"/>
+            </a:solidFill>
+          </a:ln>
+        </p:spPr>
+        <p:txBody>
+          <a:bodyPr vert="horz" lIns="91440" tIns="45720" rIns="91440" bIns="45720" rtlCol="0" anchor="ctr"/>
+          <a:lstStyle/>
+          <a:p>
+            <a:endParaRPr lang="en-US"/>
+          </a:p>
+        </p:txBody>
+      </p:sp>
+      <p:sp>
+        <p:nvSpPr>
+          <p:cNvPr id="5" name="Notes Placeholder 4"/>
+          <p:cNvSpPr>
+            <a:spLocks noGrp="1"/>
+          </p:cNvSpPr>
+          <p:nvPr>
+            <p:ph type="body" sz="quarter" idx="3"/>
+          </p:nvPr>
+        </p:nvSpPr>
+        <p:spPr>
+          <a:xfrm>
+            <a:off x="685800" y="4343400"/>
+            <a:ext cx="5486400" cy="4114800"/>
+          </a:xfrm>
+          <a:prstGeom prst="rect">
+            <a:avLst/>
+          </a:prstGeom>
+        </p:spPr>
+        <p:txBody>
+          <a:bodyPr vert="horz" lIns="91440" tIns="45720" rIns="91440" bIns="45720" rtlCol="0"/>
+          <a:lstStyle/>
+          <a:p>
+            <a:pPr lvl="0"/>
+            <a:r>
+              <a:rPr lang="en-US" smtClean="0"/>
+              <a:t>Click to edit Master text styles</a:t>
+            </a:r>
+          </a:p>
+          <a:p>
+            <a:pPr lvl="1"/>
+            <a:r>
+              <a:rPr lang="en-US" smtClean="0"/>
+              <a:t>Second level</a:t>
+            </a:r>
+          </a:p>
+          <a:p>
+            <a:pPr lvl="2"/>
+            <a:r>
+              <a:rPr lang="en-US" smtClean="0"/>
+              <a:t>Third level</a:t>
+            </a:r>
+          </a:p>
+          <a:p>
+            <a:pPr lvl="3"/>
+            <a:r>
+              <a:rPr lang="en-US" smtClean="0"/>
+              <a:t>Fourth level</a:t>
+            </a:r>
+          </a:p>
+          <a:p>
+            <a:pPr lvl="4"/>
+            <a:r>
+              <a:rPr lang="en-US" smtClean="0"/>
+              <a:t>Fifth level</a:t>
+            </a:r>
+            <a:endParaRPr lang="en-US"/>
+          </a:p>
+        </p:txBody>
+      </p:sp>
+      <p:sp>
+        <p:nvSpPr>
+          <p:cNvPr id="6" name="Footer Placeholder 5"/>
+          <p:cNvSpPr>
+            <a:spLocks noGrp="1"/>
+          </p:cNvSpPr>
+          <p:nvPr>
+            <p:ph type="ftr" sz="quarter" idx="4"/>
+          </p:nvPr>
+        </p:nvSpPr>
+        <p:spPr>
+          <a:xfrm>
+            <a:off x="0" y="8685213"/>
+            <a:ext cx="2971800" cy="457200"/>
+          </a:xfrm>
+          <a:prstGeom prst="rect">
+            <a:avLst/>
+          </a:prstGeom>
+        </p:spPr>
+        <p:txBody>
+          <a:bodyPr vert="horz" lIns="91440" tIns="45720" rIns="91440" bIns="45720" rtlCol="0" anchor="b"/>
+          <a:lstStyle>
+            <a:lvl1pPr algn="l">
+              <a:defRPr sz="1200"/>
+            </a:lvl1pPr>
+          </a:lstStyle>
+          <a:p>
+            <a:endParaRPr lang="en-US"/>
+          </a:p>
+        </p:txBody>
+      </p:sp>
+      <p:sp>
+        <p:nvSpPr>
+          <p:cNvPr id="7" name="Slide Number Placeholder 6"/>
+          <p:cNvSpPr>
+            <a:spLocks noGrp="1"/>
+          </p:cNvSpPr>
+          <p:nvPr>
+            <p:ph type="sldNum" sz="quarter" idx="5"/>
+          </p:nvPr>
+        </p:nvSpPr>
+        <p:spPr>
+          <a:xfrm>
+            <a:off x="3884613" y="8685213"/>
+            <a:ext cx="2971800" cy="457200"/>
+          </a:xfrm>
+          <a:prstGeom prst="rect">
+            <a:avLst/>
+          </a:prstGeom>
+        </p:spPr>
+        <p:txBody>
+          <a:bodyPr vert="horz" lIns="91440" tIns="45720" rIns="91440" bIns="45720" rtlCol="0" anchor="b"/>
+          <a:lstStyle>
+            <a:lvl1pPr algn="r">
+              <a:defRPr sz="1200"/>
+            </a:lvl1pPr>
+          </a:lstStyle>
+          <a:p>
+            <a:fld id="{CA2DF289-9D97-4067-AB06-510B2FA70A8D}" type="slidenum">
+              <a:rPr lang="en-US" smtClean="0"/>
+              <a:t>‹#›</a:t>
+            </a:fld>
+            <a:endParaRPr lang="en-US"/>
+          </a:p>
+        </p:txBody>
+      </p:sp>
+    </p:spTree>
+    <p:extLst>
+      <p:ext uri="{BB962C8B-B14F-4D97-AF65-F5344CB8AC3E}">
+        <p14:creationId xmlns:p14="http://schemas.microsoft.com/office/powerpoint/2010/main" val="1636236905"/>
+      </p:ext>
+    </p:extLst>
+  </p:cSld>
+  <p:clrMap bg1="lt1" tx1="dk1" bg2="lt2" tx2="dk2" accent1="accent1" accent2="accent2" accent3="accent3" accent4="accent4" accent5="accent5" accent6="accent6" hlink="hlink" folHlink="folHlink"/>
+  <p:notesStyle>
+    <a:lvl1pPr marL="0" algn="l" defTabSz="914400" rtl="0" eaLnBrk="1" latinLnBrk="0" hangingPunct="1">
+      <a:defRPr sz="1200" kern="1200">
+        <a:solidFill>
+          <a:schemeClr val="tx1"/>
+        </a:solidFill>
+        <a:latin typeface="+mn-lt"/>
+        <a:ea typeface="+mn-ea"/>
+        <a:cs typeface="+mn-cs"/>
+      </a:defRPr>
+    </a:lvl1pPr>
+    <a:lvl2pPr marL="457200" algn="l" defTabSz="914400" rtl="0" eaLnBrk="1" latinLnBrk="0" hangingPunct="1">
+      <a:defRPr sz="1200" kern="1200">
+        <a:solidFill>
+          <a:schemeClr val="tx1"/>
+        </a:solidFill>
+        <a:latin typeface="+mn-lt"/>
+        <a:ea typeface="+mn-ea"/>
+        <a:cs typeface="+mn-cs"/>
+      </a:defRPr>
+    </a:lvl2pPr>
+    <a:lvl3pPr marL="914400" algn="l" defTabSz="914400" rtl="0" eaLnBrk="1" latinLnBrk="0" hangingPunct="1">
+      <a:defRPr sz="1200" kern="1200">
+        <a:solidFill>
+          <a:schemeClr val="tx1"/>
+        </a:solidFill>
+        <a:latin typeface="+mn-lt"/>
+        <a:ea typeface="+mn-ea"/>
+        <a:cs typeface="+mn-cs"/>
+      </a:defRPr>
+    </a:lvl3pPr>
+    <a:lvl4pPr marL="1371600" algn="l" defTabSz="914400" rtl="0" eaLnBrk="1" latinLnBrk="0" hangingPunct="1">
+      <a:defRPr sz="1200" kern="1200">
+        <a:solidFill>
+          <a:schemeClr val="tx1"/>
+        </a:solidFill>
+        <a:latin typeface="+mn-lt"/>
+        <a:ea typeface="+mn-ea"/>
+        <a:cs typeface="+mn-cs"/>
+      </a:defRPr>
+    </a:lvl4pPr>
+    <a:lvl5pPr marL="1828800" algn="l" defTabSz="914400" rtl="0" eaLnBrk="1" latinLnBrk="0" hangingPunct="1">
+      <a:defRPr sz="1200" kern="1200">
+        <a:solidFill>
+          <a:schemeClr val="tx1"/>
+        </a:solidFill>
+        <a:latin typeface="+mn-lt"/>
+        <a:ea typeface="+mn-ea"/>
+        <a:cs typeface="+mn-cs"/>
+      </a:defRPr>
+    </a:lvl5pPr>
+    <a:lvl6pPr marL="2286000" algn="l" defTabSz="914400" rtl="0" eaLnBrk="1" latinLnBrk="0" hangingPunct="1">
+      <a:defRPr sz="1200" kern="1200">
+        <a:solidFill>
+          <a:schemeClr val="tx1"/>
+        </a:solidFill>
+        <a:latin typeface="+mn-lt"/>
+        <a:ea typeface="+mn-ea"/>
+        <a:cs typeface="+mn-cs"/>
+      </a:defRPr>
+    </a:lvl6pPr>
+    <a:lvl7pPr marL="2743200" algn="l" defTabSz="914400" rtl="0" eaLnBrk="1" latinLnBrk="0" hangingPunct="1">
+      <a:defRPr sz="1200" kern="1200">
+        <a:solidFill>
+          <a:schemeClr val="tx1"/>
+        </a:solidFill>
+        <a:latin typeface="+mn-lt"/>
+        <a:ea typeface="+mn-ea"/>
+        <a:cs typeface="+mn-cs"/>
+      </a:defRPr>
+    </a:lvl7pPr>
+    <a:lvl8pPr marL="3200400" algn="l" defTabSz="914400" rtl="0" eaLnBrk="1" latinLnBrk="0" hangingPunct="1">
+      <a:defRPr sz="1200" kern="1200">
+        <a:solidFill>
+          <a:schemeClr val="tx1"/>
+        </a:solidFill>
+        <a:latin typeface="+mn-lt"/>
+        <a:ea typeface="+mn-ea"/>
+        <a:cs typeface="+mn-cs"/>
+      </a:defRPr>
+    </a:lvl8pPr>
+    <a:lvl9pPr marL="3657600" algn="l" defTabSz="914400" rtl="0" eaLnBrk="1" latinLnBrk="0" hangingPunct="1">
+      <a:defRPr sz="1200" kern="1200">
+        <a:solidFill>
+          <a:schemeClr val="tx1"/>
+        </a:solidFill>
+        <a:latin typeface="+mn-lt"/>
+        <a:ea typeface="+mn-ea"/>
+        <a:cs typeface="+mn-cs"/>
+      </a:defRPr>
+    </a:lvl9pPr>
+  </p:notesStyle>
+</p:notesMaster>
+</file>
+
+<file path=ppt/notesSlides/notesSlide1.xml><?xml version="1.0" encoding="utf-8"?>
+<p:notes xmlns:a="http://schemas.openxmlformats.org/drawingml/2006/main" xmlns:r="http://schemas.openxmlformats.org/officeDocument/2006/relationships" xmlns:p="http://schemas.openxmlformats.org/presentationml/2006/main">
+  <p:cSld>
+    <p:spTree>
+      <p:nvGrpSpPr>
+        <p:cNvPr id="1" name=""/>
+        <p:cNvGrpSpPr/>
+        <p:nvPr/>
+      </p:nvGrpSpPr>
+      <p:grpSpPr>
+        <a:xfrm>
+          <a:off x="0" y="0"/>
+          <a:ext cx="0" cy="0"/>
+          <a:chOff x="0" y="0"/>
+          <a:chExt cx="0" cy="0"/>
+        </a:xfrm>
+      </p:grpSpPr>
+      <p:sp>
+        <p:nvSpPr>
+          <p:cNvPr id="2" name="Slide Image Placeholder 1"/>
+          <p:cNvSpPr>
+            <a:spLocks noGrp="1" noRot="1" noChangeAspect="1"/>
+          </p:cNvSpPr>
+          <p:nvPr>
+            <p:ph type="sldImg"/>
+          </p:nvPr>
+        </p:nvSpPr>
+        <p:spPr/>
+      </p:sp>
+      <p:sp>
+        <p:nvSpPr>
+          <p:cNvPr id="3" name="Notes Placeholder 2"/>
+          <p:cNvSpPr>
+            <a:spLocks noGrp="1"/>
+          </p:cNvSpPr>
+          <p:nvPr>
+            <p:ph type="body" idx="1"/>
+          </p:nvPr>
+        </p:nvSpPr>
+        <p:spPr/>
+        <p:txBody>
+          <a:bodyPr/>
+          <a:lstStyle/>
+          <a:p>
+            <a:endParaRPr lang="en-US"/>
+          </a:p>
+        </p:txBody>
+      </p:sp>
+      <p:sp>
+        <p:nvSpPr>
+          <p:cNvPr id="4" name="Slide Number Placeholder 3"/>
+          <p:cNvSpPr>
+            <a:spLocks noGrp="1"/>
+          </p:cNvSpPr>
+          <p:nvPr>
+            <p:ph type="sldNum" sz="quarter" idx="10"/>
+          </p:nvPr>
+        </p:nvSpPr>
+        <p:spPr/>
+        <p:txBody>
+          <a:bodyPr/>
+          <a:lstStyle/>
+          <a:p>
+            <a:fld id="{CA2DF289-9D97-4067-AB06-510B2FA70A8D}" type="slidenum">
+              <a:rPr lang="en-US" smtClean="0"/>
+              <a:t>1</a:t>
+            </a:fld>
+            <a:endParaRPr lang="en-US"/>
+          </a:p>
+        </p:txBody>
+      </p:sp>
+    </p:spTree>
+    <p:extLst>
+      <p:ext uri="{BB962C8B-B14F-4D97-AF65-F5344CB8AC3E}">
+        <p14:creationId xmlns:p14="http://schemas.microsoft.com/office/powerpoint/2010/main" val="3413852554"/>
+      </p:ext>
+    </p:extLst>
+  </p:cSld>
+  <p:clrMapOvr>
+    <a:masterClrMapping/>
+  </p:clrMapOvr>
+</p:notes>
+</file>
+
 <file path=ppt/slideLayouts/slideLayout1.xml><?xml version="1.0" encoding="utf-8"?>
 <p:sldLayout xmlns:a="http://schemas.openxmlformats.org/drawingml/2006/main" xmlns:r="http://schemas.openxmlformats.org/officeDocument/2006/relationships" xmlns:p="http://schemas.openxmlformats.org/presentationml/2006/main" type="title" preserve="1">
   <p:cSld name="Title Slide">
@@ -288,7 +725,7 @@
           <a:p>
             <a:fld id="{DC2CCCA2-B219-4959-BD4C-F5FCBC379A30}" type="datetimeFigureOut">
               <a:rPr lang="en-US" smtClean="0"/>
-              <a:t>3/10/2013</a:t>
+              <a:t>2/22/2014</a:t>
             </a:fld>
             <a:endParaRPr lang="en-US"/>
           </a:p>
@@ -458,7 +895,7 @@
           <a:p>
             <a:fld id="{DC2CCCA2-B219-4959-BD4C-F5FCBC379A30}" type="datetimeFigureOut">
               <a:rPr lang="en-US" smtClean="0"/>
-              <a:t>3/10/2013</a:t>
+              <a:t>2/22/2014</a:t>
             </a:fld>
             <a:endParaRPr lang="en-US"/>
           </a:p>
@@ -638,7 +1075,7 @@
           <a:p>
             <a:fld id="{DC2CCCA2-B219-4959-BD4C-F5FCBC379A30}" type="datetimeFigureOut">
               <a:rPr lang="en-US" smtClean="0"/>
-              <a:t>3/10/2013</a:t>
+              <a:t>2/22/2014</a:t>
             </a:fld>
             <a:endParaRPr lang="en-US"/>
           </a:p>
@@ -808,7 +1245,7 @@
           <a:p>
             <a:fld id="{DC2CCCA2-B219-4959-BD4C-F5FCBC379A30}" type="datetimeFigureOut">
               <a:rPr lang="en-US" smtClean="0"/>
-              <a:t>3/10/2013</a:t>
+              <a:t>2/22/2014</a:t>
             </a:fld>
             <a:endParaRPr lang="en-US"/>
           </a:p>
@@ -1054,7 +1491,7 @@
           <a:p>
             <a:fld id="{DC2CCCA2-B219-4959-BD4C-F5FCBC379A30}" type="datetimeFigureOut">
               <a:rPr lang="en-US" smtClean="0"/>
-              <a:t>3/10/2013</a:t>
+              <a:t>2/22/2014</a:t>
             </a:fld>
             <a:endParaRPr lang="en-US"/>
           </a:p>
@@ -1342,7 +1779,7 @@
           <a:p>
             <a:fld id="{DC2CCCA2-B219-4959-BD4C-F5FCBC379A30}" type="datetimeFigureOut">
               <a:rPr lang="en-US" smtClean="0"/>
-              <a:t>3/10/2013</a:t>
+              <a:t>2/22/2014</a:t>
             </a:fld>
             <a:endParaRPr lang="en-US"/>
           </a:p>
@@ -1764,7 +2201,7 @@
           <a:p>
             <a:fld id="{DC2CCCA2-B219-4959-BD4C-F5FCBC379A30}" type="datetimeFigureOut">
               <a:rPr lang="en-US" smtClean="0"/>
-              <a:t>3/10/2013</a:t>
+              <a:t>2/22/2014</a:t>
             </a:fld>
             <a:endParaRPr lang="en-US"/>
           </a:p>
@@ -1882,7 +2319,7 @@
           <a:p>
             <a:fld id="{DC2CCCA2-B219-4959-BD4C-F5FCBC379A30}" type="datetimeFigureOut">
               <a:rPr lang="en-US" smtClean="0"/>
-              <a:t>3/10/2013</a:t>
+              <a:t>2/22/2014</a:t>
             </a:fld>
             <a:endParaRPr lang="en-US"/>
           </a:p>
@@ -1977,7 +2414,7 @@
           <a:p>
             <a:fld id="{DC2CCCA2-B219-4959-BD4C-F5FCBC379A30}" type="datetimeFigureOut">
               <a:rPr lang="en-US" smtClean="0"/>
-              <a:t>3/10/2013</a:t>
+              <a:t>2/22/2014</a:t>
             </a:fld>
             <a:endParaRPr lang="en-US"/>
           </a:p>
@@ -2254,7 +2691,7 @@
           <a:p>
             <a:fld id="{DC2CCCA2-B219-4959-BD4C-F5FCBC379A30}" type="datetimeFigureOut">
               <a:rPr lang="en-US" smtClean="0"/>
-              <a:t>3/10/2013</a:t>
+              <a:t>2/22/2014</a:t>
             </a:fld>
             <a:endParaRPr lang="en-US"/>
           </a:p>
@@ -2507,7 +2944,7 @@
           <a:p>
             <a:fld id="{DC2CCCA2-B219-4959-BD4C-F5FCBC379A30}" type="datetimeFigureOut">
               <a:rPr lang="en-US" smtClean="0"/>
-              <a:t>3/10/2013</a:t>
+              <a:t>2/22/2014</a:t>
             </a:fld>
             <a:endParaRPr lang="en-US"/>
           </a:p>
@@ -2720,7 +3157,7 @@
           <a:p>
             <a:fld id="{DC2CCCA2-B219-4959-BD4C-F5FCBC379A30}" type="datetimeFigureOut">
               <a:rPr lang="en-US" smtClean="0"/>
-              <a:t>3/10/2013</a:t>
+              <a:t>2/22/2014</a:t>
             </a:fld>
             <a:endParaRPr lang="en-US"/>
           </a:p>
@@ -3145,14 +3582,14 @@
       </p:grpSpPr>
       <p:pic>
         <p:nvPicPr>
-          <p:cNvPr id="1028" name="Picture 4"/>
+          <p:cNvPr id="1030" name="Picture 6"/>
           <p:cNvPicPr>
             <a:picLocks noChangeAspect="1" noChangeArrowheads="1"/>
           </p:cNvPicPr>
           <p:nvPr/>
         </p:nvPicPr>
         <p:blipFill>
-          <a:blip r:embed="rId2">
+          <a:blip r:embed="rId3">
             <a:extLst>
               <a:ext uri="{28A0092B-C50C-407E-A947-70E740481C1C}">
                 <a14:useLocalDpi xmlns:a14="http://schemas.microsoft.com/office/drawing/2010/main" val="0"/>
@@ -3166,8 +3603,8 @@
         </p:blipFill>
         <p:spPr bwMode="auto">
           <a:xfrm>
-            <a:off x="566738" y="676148"/>
-            <a:ext cx="8120062" cy="5572252"/>
+            <a:off x="551686" y="692003"/>
+            <a:ext cx="8087815" cy="5593898"/>
           </a:xfrm>
           <a:prstGeom prst="rect">
             <a:avLst/>
@@ -3176,7 +3613,6 @@
           <a:ln>
             <a:noFill/>
           </a:ln>
-          <a:effectLst/>
           <a:extLst>
             <a:ext uri="{909E8E84-426E-40DD-AFC4-6F175D3DCCD1}">
               <a14:hiddenFill xmlns:a14="http://schemas.microsoft.com/office/drawing/2010/main">
@@ -3194,15 +3630,6 @@
                 <a:headEnd/>
                 <a:tailEnd/>
               </a14:hiddenLine>
-            </a:ext>
-            <a:ext uri="{AF507438-7753-43E0-B8FC-AC1667EBCBE1}">
-              <a14:hiddenEffects xmlns:a14="http://schemas.microsoft.com/office/drawing/2010/main">
-                <a:effectLst>
-                  <a:outerShdw dist="35921" dir="2700000" algn="ctr" rotWithShape="0">
-                    <a:schemeClr val="bg2"/>
-                  </a:outerShdw>
-                </a:effectLst>
-              </a14:hiddenEffects>
             </a:ext>
           </a:extLst>
         </p:spPr>
@@ -3388,8 +3815,8 @@
               <a:gd name="adj2" fmla="val -801"/>
               <a:gd name="adj3" fmla="val 52704"/>
               <a:gd name="adj4" fmla="val -10024"/>
-              <a:gd name="adj5" fmla="val 237366"/>
-              <a:gd name="adj6" fmla="val -47603"/>
+              <a:gd name="adj5" fmla="val 263775"/>
+              <a:gd name="adj6" fmla="val -70192"/>
             </a:avLst>
           </a:prstGeom>
           <a:solidFill>
@@ -3711,7 +4138,7 @@
         </p:nvSpPr>
         <p:spPr>
           <a:xfrm>
-            <a:off x="1082404" y="6272784"/>
+            <a:off x="1082404" y="6303264"/>
             <a:ext cx="1040674" cy="326243"/>
           </a:xfrm>
           <a:prstGeom prst="borderCallout2">
@@ -3796,8 +4223,8 @@
               <a:gd name="adj2" fmla="val 100245"/>
               <a:gd name="adj3" fmla="val 43862"/>
               <a:gd name="adj4" fmla="val 275663"/>
-              <a:gd name="adj5" fmla="val -13347"/>
-              <a:gd name="adj6" fmla="val 314908"/>
+              <a:gd name="adj5" fmla="val -66400"/>
+              <a:gd name="adj6" fmla="val 299287"/>
             </a:avLst>
           </a:prstGeom>
           <a:solidFill>
@@ -3858,7 +4285,7 @@
         </p:nvSpPr>
         <p:spPr>
           <a:xfrm>
-            <a:off x="1600201" y="2590800"/>
+            <a:off x="1600201" y="2682240"/>
             <a:ext cx="775062" cy="326243"/>
           </a:xfrm>
           <a:prstGeom prst="borderCallout2">
@@ -3929,7 +4356,7 @@
         </p:nvSpPr>
         <p:spPr>
           <a:xfrm>
-            <a:off x="4450784" y="2286000"/>
+            <a:off x="4082847" y="2416957"/>
             <a:ext cx="641553" cy="326243"/>
           </a:xfrm>
           <a:prstGeom prst="borderCallout2">
@@ -4095,8 +4522,8 @@
               <a:gd name="adj2" fmla="val -801"/>
               <a:gd name="adj3" fmla="val 44918"/>
               <a:gd name="adj4" fmla="val -8066"/>
-              <a:gd name="adj5" fmla="val -373879"/>
-              <a:gd name="adj6" fmla="val -72592"/>
+              <a:gd name="adj5" fmla="val -436164"/>
+              <a:gd name="adj6" fmla="val -75091"/>
             </a:avLst>
           </a:prstGeom>
           <a:solidFill>
@@ -4168,7 +4595,7 @@
         </p:nvSpPr>
         <p:spPr>
           <a:xfrm>
-            <a:off x="2743200" y="2667000"/>
+            <a:off x="2743200" y="2743200"/>
             <a:ext cx="1371600" cy="326243"/>
           </a:xfrm>
           <a:prstGeom prst="borderCallout2">
@@ -4239,7 +4666,7 @@
         </p:nvSpPr>
         <p:spPr>
           <a:xfrm>
-            <a:off x="4216763" y="1676400"/>
+            <a:off x="3530963" y="1524000"/>
             <a:ext cx="812437" cy="326243"/>
           </a:xfrm>
           <a:prstGeom prst="borderCallout2">
@@ -4319,8 +4746,8 @@
               <a:gd name="adj2" fmla="val 1144"/>
               <a:gd name="adj3" fmla="val 47414"/>
               <a:gd name="adj4" fmla="val -11394"/>
-              <a:gd name="adj5" fmla="val -853584"/>
-              <a:gd name="adj6" fmla="val -164749"/>
+              <a:gd name="adj5" fmla="val -769500"/>
+              <a:gd name="adj6" fmla="val -164748"/>
             </a:avLst>
           </a:prstGeom>
           <a:solidFill>
@@ -4381,7 +4808,7 @@
         </p:nvSpPr>
         <p:spPr>
           <a:xfrm>
-            <a:off x="143693" y="4776105"/>
+            <a:off x="123373" y="4776105"/>
             <a:ext cx="1040674" cy="634020"/>
           </a:xfrm>
           <a:prstGeom prst="borderCallout2">
@@ -4493,7 +4920,7 @@
         <p:spPr>
           <a:xfrm>
             <a:off x="381000" y="34528"/>
-            <a:ext cx="4229043" cy="369332"/>
+            <a:ext cx="4278544" cy="369332"/>
           </a:xfrm>
           <a:prstGeom prst="rect">
             <a:avLst/>
@@ -4507,12 +4934,20 @@
           <a:lstStyle/>
           <a:p>
             <a:r>
+              <a:rPr lang="en-US" b="1" dirty="0" err="1" smtClean="0">
+                <a:solidFill>
+                  <a:srgbClr val="0070C0"/>
+                </a:solidFill>
+              </a:rPr>
+              <a:t>NutShell</a:t>
+            </a:r>
+            <a:r>
               <a:rPr lang="en-US" b="1" dirty="0" smtClean="0">
                 <a:solidFill>
                   <a:srgbClr val="0070C0"/>
                 </a:solidFill>
               </a:rPr>
-              <a:t>NutShell </a:t>
+              <a:t> </a:t>
             </a:r>
             <a:r>
               <a:rPr lang="en-US" b="1" dirty="0" smtClean="0">
@@ -4520,7 +4955,7 @@
                   <a:srgbClr val="0070C0"/>
                 </a:solidFill>
               </a:rPr>
-              <a:t>4.5 </a:t>
+              <a:t>4.8x </a:t>
             </a:r>
             <a:r>
               <a:rPr lang="en-US" b="1" dirty="0" smtClean="0">
@@ -4536,15 +4971,7 @@
                   <a:srgbClr val="0070C0"/>
                 </a:solidFill>
               </a:rPr>
-              <a:t>(10 Mar 2013</a:t>
-            </a:r>
-            <a:r>
-              <a:rPr lang="en-US" b="1" dirty="0" smtClean="0">
-                <a:solidFill>
-                  <a:srgbClr val="0070C0"/>
-                </a:solidFill>
-              </a:rPr>
-              <a:t>)</a:t>
+              <a:t>(22 Feb 2014)</a:t>
             </a:r>
             <a:endParaRPr lang="en-US" b="1" dirty="0">
               <a:solidFill>
@@ -4563,7 +4990,7 @@
           <p:nvPr/>
         </p:nvPicPr>
         <p:blipFill>
-          <a:blip r:embed="rId3" cstate="print">
+          <a:blip r:embed="rId4" cstate="print">
             <a:extLst>
               <a:ext uri="{28A0092B-C50C-407E-A947-70E740481C1C}">
                 <a14:useLocalDpi xmlns:a14="http://schemas.microsoft.com/office/drawing/2010/main" val="0"/>
@@ -4601,8 +5028,8 @@
               <a:gd name="adj2" fmla="val -14153"/>
               <a:gd name="adj3" fmla="val -5395"/>
               <a:gd name="adj4" fmla="val -27191"/>
-              <a:gd name="adj5" fmla="val -1150664"/>
-              <a:gd name="adj6" fmla="val -215114"/>
+              <a:gd name="adj5" fmla="val -1177073"/>
+              <a:gd name="adj6" fmla="val -297980"/>
             </a:avLst>
           </a:prstGeom>
           <a:solidFill>
@@ -4669,8 +5096,8 @@
               <a:gd name="adj2" fmla="val -801"/>
               <a:gd name="adj3" fmla="val 52704"/>
               <a:gd name="adj4" fmla="val -10024"/>
-              <a:gd name="adj5" fmla="val 338130"/>
-              <a:gd name="adj6" fmla="val -61964"/>
+              <a:gd name="adj5" fmla="val 305119"/>
+              <a:gd name="adj6" fmla="val -153665"/>
             </a:avLst>
           </a:prstGeom>
           <a:solidFill>
@@ -4747,7 +5174,7 @@
         </p:nvSpPr>
         <p:spPr>
           <a:xfrm>
-            <a:off x="7993742" y="3962400"/>
+            <a:off x="7946094" y="4016047"/>
             <a:ext cx="884341" cy="461665"/>
           </a:xfrm>
           <a:prstGeom prst="borderCallout2">
@@ -4756,8 +5183,8 @@
               <a:gd name="adj2" fmla="val -801"/>
               <a:gd name="adj3" fmla="val 52704"/>
               <a:gd name="adj4" fmla="val -10024"/>
-              <a:gd name="adj5" fmla="val -91014"/>
-              <a:gd name="adj6" fmla="val -175685"/>
+              <a:gd name="adj5" fmla="val 32227"/>
+              <a:gd name="adj6" fmla="val -167643"/>
             </a:avLst>
           </a:prstGeom>
           <a:solidFill>
@@ -4865,7 +5292,7 @@
         </p:nvSpPr>
         <p:spPr>
           <a:xfrm>
-            <a:off x="2526792" y="4572000"/>
+            <a:off x="2560320" y="4572000"/>
             <a:ext cx="152400" cy="381000"/>
           </a:xfrm>
           <a:prstGeom prst="rect">
@@ -4955,7 +5382,7 @@
         </p:nvSpPr>
         <p:spPr>
           <a:xfrm rot="16200000">
-            <a:off x="3556001" y="2588768"/>
+            <a:off x="3556001" y="2717799"/>
             <a:ext cx="127000" cy="1752601"/>
           </a:xfrm>
           <a:prstGeom prst="leftBrace">
@@ -5296,4 +5723,289 @@
   <a:objectDefaults/>
   <a:extraClrSchemeLst/>
 </a:theme>
+</file>
+
+<file path=ppt/theme/theme2.xml><?xml version="1.0" encoding="utf-8"?>
+<a:theme xmlns:a="http://schemas.openxmlformats.org/drawingml/2006/main" name="Office Theme">
+  <a:themeElements>
+    <a:clrScheme name="Office">
+      <a:dk1>
+        <a:sysClr val="windowText" lastClr="000000"/>
+      </a:dk1>
+      <a:lt1>
+        <a:sysClr val="window" lastClr="FFFFFF"/>
+      </a:lt1>
+      <a:dk2>
+        <a:srgbClr val="1F497D"/>
+      </a:dk2>
+      <a:lt2>
+        <a:srgbClr val="EEECE1"/>
+      </a:lt2>
+      <a:accent1>
+        <a:srgbClr val="4F81BD"/>
+      </a:accent1>
+      <a:accent2>
+        <a:srgbClr val="C0504D"/>
+      </a:accent2>
+      <a:accent3>
+        <a:srgbClr val="9BBB59"/>
+      </a:accent3>
+      <a:accent4>
+        <a:srgbClr val="8064A2"/>
+      </a:accent4>
+      <a:accent5>
+        <a:srgbClr val="4BACC6"/>
+      </a:accent5>
+      <a:accent6>
+        <a:srgbClr val="F79646"/>
+      </a:accent6>
+      <a:hlink>
+        <a:srgbClr val="0000FF"/>
+      </a:hlink>
+      <a:folHlink>
+        <a:srgbClr val="800080"/>
+      </a:folHlink>
+    </a:clrScheme>
+    <a:fontScheme name="Office">
+      <a:majorFont>
+        <a:latin typeface="Calibri"/>
+        <a:ea typeface=""/>
+        <a:cs typeface=""/>
+        <a:font script="Jpan" typeface="ＭＳ Ｐゴシック"/>
+        <a:font script="Hang" typeface="맑은 고딕"/>
+        <a:font script="Hans" typeface="宋体"/>
+        <a:font script="Hant" typeface="新細明體"/>
+        <a:font script="Arab" typeface="Times New Roman"/>
+        <a:font script="Hebr" typeface="Times New Roman"/>
+        <a:font script="Thai" typeface="Angsana New"/>
+        <a:font script="Ethi" typeface="Nyala"/>
+        <a:font script="Beng" typeface="Vrinda"/>
+        <a:font script="Gujr" typeface="Shruti"/>
+        <a:font script="Khmr" typeface="MoolBoran"/>
+        <a:font script="Knda" typeface="Tunga"/>
+        <a:font script="Guru" typeface="Raavi"/>
+        <a:font script="Cans" typeface="Euphemia"/>
+        <a:font script="Cher" typeface="Plantagenet Cherokee"/>
+        <a:font script="Yiii" typeface="Microsoft Yi Baiti"/>
+        <a:font script="Tibt" typeface="Microsoft Himalaya"/>
+        <a:font script="Thaa" typeface="MV Boli"/>
+        <a:font script="Deva" typeface="Mangal"/>
+        <a:font script="Telu" typeface="Gautami"/>
+        <a:font script="Taml" typeface="Latha"/>
+        <a:font script="Syrc" typeface="Estrangelo Edessa"/>
+        <a:font script="Orya" typeface="Kalinga"/>
+        <a:font script="Mlym" typeface="Kartika"/>
+        <a:font script="Laoo" typeface="DokChampa"/>
+        <a:font script="Sinh" typeface="Iskoola Pota"/>
+        <a:font script="Mong" typeface="Mongolian Baiti"/>
+        <a:font script="Viet" typeface="Times New Roman"/>
+        <a:font script="Uigh" typeface="Microsoft Uighur"/>
+        <a:font script="Geor" typeface="Sylfaen"/>
+      </a:majorFont>
+      <a:minorFont>
+        <a:latin typeface="Calibri"/>
+        <a:ea typeface=""/>
+        <a:cs typeface=""/>
+        <a:font script="Jpan" typeface="ＭＳ Ｐゴシック"/>
+        <a:font script="Hang" typeface="맑은 고딕"/>
+        <a:font script="Hans" typeface="宋体"/>
+        <a:font script="Hant" typeface="新細明體"/>
+        <a:font script="Arab" typeface="Arial"/>
+        <a:font script="Hebr" typeface="Arial"/>
+        <a:font script="Thai" typeface="Cordia New"/>
+        <a:font script="Ethi" typeface="Nyala"/>
+        <a:font script="Beng" typeface="Vrinda"/>
+        <a:font script="Gujr" typeface="Shruti"/>
+        <a:font script="Khmr" typeface="DaunPenh"/>
+        <a:font script="Knda" typeface="Tunga"/>
+        <a:font script="Guru" typeface="Raavi"/>
+        <a:font script="Cans" typeface="Euphemia"/>
+        <a:font script="Cher" typeface="Plantagenet Cherokee"/>
+        <a:font script="Yiii" typeface="Microsoft Yi Baiti"/>
+        <a:font script="Tibt" typeface="Microsoft Himalaya"/>
+        <a:font script="Thaa" typeface="MV Boli"/>
+        <a:font script="Deva" typeface="Mangal"/>
+        <a:font script="Telu" typeface="Gautami"/>
+        <a:font script="Taml" typeface="Latha"/>
+        <a:font script="Syrc" typeface="Estrangelo Edessa"/>
+        <a:font script="Orya" typeface="Kalinga"/>
+        <a:font script="Mlym" typeface="Kartika"/>
+        <a:font script="Laoo" typeface="DokChampa"/>
+        <a:font script="Sinh" typeface="Iskoola Pota"/>
+        <a:font script="Mong" typeface="Mongolian Baiti"/>
+        <a:font script="Viet" typeface="Arial"/>
+        <a:font script="Uigh" typeface="Microsoft Uighur"/>
+        <a:font script="Geor" typeface="Sylfaen"/>
+      </a:minorFont>
+    </a:fontScheme>
+    <a:fmtScheme name="Office">
+      <a:fillStyleLst>
+        <a:solidFill>
+          <a:schemeClr val="phClr"/>
+        </a:solidFill>
+        <a:gradFill rotWithShape="1">
+          <a:gsLst>
+            <a:gs pos="0">
+              <a:schemeClr val="phClr">
+                <a:tint val="50000"/>
+                <a:satMod val="300000"/>
+              </a:schemeClr>
+            </a:gs>
+            <a:gs pos="35000">
+              <a:schemeClr val="phClr">
+                <a:tint val="37000"/>
+                <a:satMod val="300000"/>
+              </a:schemeClr>
+            </a:gs>
+            <a:gs pos="100000">
+              <a:schemeClr val="phClr">
+                <a:tint val="15000"/>
+                <a:satMod val="350000"/>
+              </a:schemeClr>
+            </a:gs>
+          </a:gsLst>
+          <a:lin ang="16200000" scaled="1"/>
+        </a:gradFill>
+        <a:gradFill rotWithShape="1">
+          <a:gsLst>
+            <a:gs pos="0">
+              <a:schemeClr val="phClr">
+                <a:shade val="51000"/>
+                <a:satMod val="130000"/>
+              </a:schemeClr>
+            </a:gs>
+            <a:gs pos="80000">
+              <a:schemeClr val="phClr">
+                <a:shade val="93000"/>
+                <a:satMod val="130000"/>
+              </a:schemeClr>
+            </a:gs>
+            <a:gs pos="100000">
+              <a:schemeClr val="phClr">
+                <a:shade val="94000"/>
+                <a:satMod val="135000"/>
+              </a:schemeClr>
+            </a:gs>
+          </a:gsLst>
+          <a:lin ang="16200000" scaled="0"/>
+        </a:gradFill>
+      </a:fillStyleLst>
+      <a:lnStyleLst>
+        <a:ln w="9525" cap="flat" cmpd="sng" algn="ctr">
+          <a:solidFill>
+            <a:schemeClr val="phClr">
+              <a:shade val="95000"/>
+              <a:satMod val="105000"/>
+            </a:schemeClr>
+          </a:solidFill>
+          <a:prstDash val="solid"/>
+        </a:ln>
+        <a:ln w="25400" cap="flat" cmpd="sng" algn="ctr">
+          <a:solidFill>
+            <a:schemeClr val="phClr"/>
+          </a:solidFill>
+          <a:prstDash val="solid"/>
+        </a:ln>
+        <a:ln w="38100" cap="flat" cmpd="sng" algn="ctr">
+          <a:solidFill>
+            <a:schemeClr val="phClr"/>
+          </a:solidFill>
+          <a:prstDash val="solid"/>
+        </a:ln>
+      </a:lnStyleLst>
+      <a:effectStyleLst>
+        <a:effectStyle>
+          <a:effectLst>
+            <a:outerShdw blurRad="40000" dist="20000" dir="5400000" rotWithShape="0">
+              <a:srgbClr val="000000">
+                <a:alpha val="38000"/>
+              </a:srgbClr>
+            </a:outerShdw>
+          </a:effectLst>
+        </a:effectStyle>
+        <a:effectStyle>
+          <a:effectLst>
+            <a:outerShdw blurRad="40000" dist="23000" dir="5400000" rotWithShape="0">
+              <a:srgbClr val="000000">
+                <a:alpha val="35000"/>
+              </a:srgbClr>
+            </a:outerShdw>
+          </a:effectLst>
+        </a:effectStyle>
+        <a:effectStyle>
+          <a:effectLst>
+            <a:outerShdw blurRad="40000" dist="23000" dir="5400000" rotWithShape="0">
+              <a:srgbClr val="000000">
+                <a:alpha val="35000"/>
+              </a:srgbClr>
+            </a:outerShdw>
+          </a:effectLst>
+          <a:scene3d>
+            <a:camera prst="orthographicFront">
+              <a:rot lat="0" lon="0" rev="0"/>
+            </a:camera>
+            <a:lightRig rig="threePt" dir="t">
+              <a:rot lat="0" lon="0" rev="1200000"/>
+            </a:lightRig>
+          </a:scene3d>
+          <a:sp3d>
+            <a:bevelT w="63500" h="25400"/>
+          </a:sp3d>
+        </a:effectStyle>
+      </a:effectStyleLst>
+      <a:bgFillStyleLst>
+        <a:solidFill>
+          <a:schemeClr val="phClr"/>
+        </a:solidFill>
+        <a:gradFill rotWithShape="1">
+          <a:gsLst>
+            <a:gs pos="0">
+              <a:schemeClr val="phClr">
+                <a:tint val="40000"/>
+                <a:satMod val="350000"/>
+              </a:schemeClr>
+            </a:gs>
+            <a:gs pos="40000">
+              <a:schemeClr val="phClr">
+                <a:tint val="45000"/>
+                <a:shade val="99000"/>
+                <a:satMod val="350000"/>
+              </a:schemeClr>
+            </a:gs>
+            <a:gs pos="100000">
+              <a:schemeClr val="phClr">
+                <a:shade val="20000"/>
+                <a:satMod val="255000"/>
+              </a:schemeClr>
+            </a:gs>
+          </a:gsLst>
+          <a:path path="circle">
+            <a:fillToRect l="50000" t="-80000" r="50000" b="180000"/>
+          </a:path>
+        </a:gradFill>
+        <a:gradFill rotWithShape="1">
+          <a:gsLst>
+            <a:gs pos="0">
+              <a:schemeClr val="phClr">
+                <a:tint val="80000"/>
+                <a:satMod val="300000"/>
+              </a:schemeClr>
+            </a:gs>
+            <a:gs pos="100000">
+              <a:schemeClr val="phClr">
+                <a:shade val="30000"/>
+                <a:satMod val="200000"/>
+              </a:schemeClr>
+            </a:gs>
+          </a:gsLst>
+          <a:path path="circle">
+            <a:fillToRect l="50000" t="50000" r="50000" b="50000"/>
+          </a:path>
+        </a:gradFill>
+      </a:bgFillStyleLst>
+    </a:fmtScheme>
+  </a:themeElements>
+  <a:objectDefaults/>
+  <a:extraClrSchemeLst/>
+</a:theme>
 </file>
</xml_diff>

<commit_message>
// bug fix preventing closing cmd imemdiately after opening
</commit_message>
<xml_diff>
--- a/install/nutshell.pptx
+++ b/install/nutshell.pptx
@@ -107,6 +107,22 @@
       </a:defRPr>
     </a:lvl9pPr>
   </p:defaultTextStyle>
+  <p:extLst>
+    <p:ext uri="{EFAFB233-063F-42B5-8137-9DF3F51BA10A}">
+      <p15:sldGuideLst xmlns:p15="http://schemas.microsoft.com/office/powerpoint/2012/main">
+        <p15:guide id="1" orient="horz" pos="2160">
+          <p15:clr>
+            <a:srgbClr val="A4A3A4"/>
+          </p15:clr>
+        </p15:guide>
+        <p15:guide id="2" pos="2880">
+          <p15:clr>
+            <a:srgbClr val="A4A3A4"/>
+          </p15:clr>
+        </p15:guide>
+      </p15:sldGuideLst>
+    </p:ext>
+  </p:extLst>
 </p:presentation>
 </file>
 
@@ -192,7 +208,7 @@
           <a:p>
             <a:fld id="{342C59F0-A296-4EFD-8A4B-06D50F7F91F3}" type="datetimeFigureOut">
               <a:rPr lang="en-US" smtClean="0"/>
-              <a:t>1/18/2015</a:t>
+              <a:t>10/01/2018</a:t>
             </a:fld>
             <a:endParaRPr lang="en-US"/>
           </a:p>
@@ -725,7 +741,7 @@
           <a:p>
             <a:fld id="{DC2CCCA2-B219-4959-BD4C-F5FCBC379A30}" type="datetimeFigureOut">
               <a:rPr lang="en-US" smtClean="0"/>
-              <a:t>1/18/2015</a:t>
+              <a:t>10/01/2018</a:t>
             </a:fld>
             <a:endParaRPr lang="en-US"/>
           </a:p>
@@ -895,7 +911,7 @@
           <a:p>
             <a:fld id="{DC2CCCA2-B219-4959-BD4C-F5FCBC379A30}" type="datetimeFigureOut">
               <a:rPr lang="en-US" smtClean="0"/>
-              <a:t>1/18/2015</a:t>
+              <a:t>10/01/2018</a:t>
             </a:fld>
             <a:endParaRPr lang="en-US"/>
           </a:p>
@@ -1075,7 +1091,7 @@
           <a:p>
             <a:fld id="{DC2CCCA2-B219-4959-BD4C-F5FCBC379A30}" type="datetimeFigureOut">
               <a:rPr lang="en-US" smtClean="0"/>
-              <a:t>1/18/2015</a:t>
+              <a:t>10/01/2018</a:t>
             </a:fld>
             <a:endParaRPr lang="en-US"/>
           </a:p>
@@ -1245,7 +1261,7 @@
           <a:p>
             <a:fld id="{DC2CCCA2-B219-4959-BD4C-F5FCBC379A30}" type="datetimeFigureOut">
               <a:rPr lang="en-US" smtClean="0"/>
-              <a:t>1/18/2015</a:t>
+              <a:t>10/01/2018</a:t>
             </a:fld>
             <a:endParaRPr lang="en-US"/>
           </a:p>
@@ -1491,7 +1507,7 @@
           <a:p>
             <a:fld id="{DC2CCCA2-B219-4959-BD4C-F5FCBC379A30}" type="datetimeFigureOut">
               <a:rPr lang="en-US" smtClean="0"/>
-              <a:t>1/18/2015</a:t>
+              <a:t>10/01/2018</a:t>
             </a:fld>
             <a:endParaRPr lang="en-US"/>
           </a:p>
@@ -1779,7 +1795,7 @@
           <a:p>
             <a:fld id="{DC2CCCA2-B219-4959-BD4C-F5FCBC379A30}" type="datetimeFigureOut">
               <a:rPr lang="en-US" smtClean="0"/>
-              <a:t>1/18/2015</a:t>
+              <a:t>10/01/2018</a:t>
             </a:fld>
             <a:endParaRPr lang="en-US"/>
           </a:p>
@@ -2201,7 +2217,7 @@
           <a:p>
             <a:fld id="{DC2CCCA2-B219-4959-BD4C-F5FCBC379A30}" type="datetimeFigureOut">
               <a:rPr lang="en-US" smtClean="0"/>
-              <a:t>1/18/2015</a:t>
+              <a:t>10/01/2018</a:t>
             </a:fld>
             <a:endParaRPr lang="en-US"/>
           </a:p>
@@ -2319,7 +2335,7 @@
           <a:p>
             <a:fld id="{DC2CCCA2-B219-4959-BD4C-F5FCBC379A30}" type="datetimeFigureOut">
               <a:rPr lang="en-US" smtClean="0"/>
-              <a:t>1/18/2015</a:t>
+              <a:t>10/01/2018</a:t>
             </a:fld>
             <a:endParaRPr lang="en-US"/>
           </a:p>
@@ -2414,7 +2430,7 @@
           <a:p>
             <a:fld id="{DC2CCCA2-B219-4959-BD4C-F5FCBC379A30}" type="datetimeFigureOut">
               <a:rPr lang="en-US" smtClean="0"/>
-              <a:t>1/18/2015</a:t>
+              <a:t>10/01/2018</a:t>
             </a:fld>
             <a:endParaRPr lang="en-US"/>
           </a:p>
@@ -2691,7 +2707,7 @@
           <a:p>
             <a:fld id="{DC2CCCA2-B219-4959-BD4C-F5FCBC379A30}" type="datetimeFigureOut">
               <a:rPr lang="en-US" smtClean="0"/>
-              <a:t>1/18/2015</a:t>
+              <a:t>10/01/2018</a:t>
             </a:fld>
             <a:endParaRPr lang="en-US"/>
           </a:p>
@@ -2944,7 +2960,7 @@
           <a:p>
             <a:fld id="{DC2CCCA2-B219-4959-BD4C-F5FCBC379A30}" type="datetimeFigureOut">
               <a:rPr lang="en-US" smtClean="0"/>
-              <a:t>1/18/2015</a:t>
+              <a:t>10/01/2018</a:t>
             </a:fld>
             <a:endParaRPr lang="en-US"/>
           </a:p>
@@ -3157,7 +3173,7 @@
           <a:p>
             <a:fld id="{DC2CCCA2-B219-4959-BD4C-F5FCBC379A30}" type="datetimeFigureOut">
               <a:rPr lang="en-US" smtClean="0"/>
-              <a:t>1/18/2015</a:t>
+              <a:t>10/01/2018</a:t>
             </a:fld>
             <a:endParaRPr lang="en-US"/>
           </a:p>
@@ -3989,8 +4005,8 @@
               <a:gd name="adj2" fmla="val -801"/>
               <a:gd name="adj3" fmla="val 52704"/>
               <a:gd name="adj4" fmla="val -10024"/>
-              <a:gd name="adj5" fmla="val -72197"/>
-              <a:gd name="adj6" fmla="val -73407"/>
+              <a:gd name="adj5" fmla="val 7029"/>
+              <a:gd name="adj6" fmla="val -105594"/>
             </a:avLst>
           </a:prstGeom>
           <a:solidFill>
@@ -4522,8 +4538,8 @@
               <a:gd name="adj2" fmla="val -801"/>
               <a:gd name="adj3" fmla="val 52493"/>
               <a:gd name="adj4" fmla="val -5869"/>
-              <a:gd name="adj5" fmla="val 203259"/>
-              <a:gd name="adj6" fmla="val -2106"/>
+              <a:gd name="adj5" fmla="val 215236"/>
+              <a:gd name="adj6" fmla="val -22619"/>
             </a:avLst>
           </a:prstGeom>
           <a:solidFill>
@@ -4664,8 +4680,8 @@
               <a:gd name="adj2" fmla="val 1144"/>
               <a:gd name="adj3" fmla="val 47414"/>
               <a:gd name="adj4" fmla="val -11394"/>
-              <a:gd name="adj5" fmla="val -817881"/>
-              <a:gd name="adj6" fmla="val -128689"/>
+              <a:gd name="adj5" fmla="val -832254"/>
+              <a:gd name="adj6" fmla="val -136235"/>
             </a:avLst>
           </a:prstGeom>
           <a:solidFill>
@@ -4766,7 +4782,7 @@
         </p:nvSpPr>
         <p:spPr>
           <a:xfrm>
-            <a:off x="25400" y="4857385"/>
+            <a:off x="-66764" y="4648200"/>
             <a:ext cx="1040674" cy="634020"/>
           </a:xfrm>
           <a:prstGeom prst="borderCallout2">
@@ -4830,20 +4846,28 @@
           <a:p>
             <a:pPr algn="ctr"/>
             <a:r>
+              <a:rPr lang="en-US" sz="1000">
+                <a:solidFill>
+                  <a:schemeClr val="tx1"/>
+                </a:solidFill>
+              </a:rPr>
+              <a:t>b</a:t>
+            </a:r>
+            <a:r>
+              <a:rPr lang="en-US" sz="1000" smtClean="0">
+                <a:solidFill>
+                  <a:schemeClr val="tx1"/>
+                </a:solidFill>
+              </a:rPr>
+              <a:t>etween </a:t>
+            </a:r>
+            <a:r>
               <a:rPr lang="en-US" sz="1000" dirty="0" smtClean="0">
                 <a:solidFill>
                   <a:schemeClr val="tx1"/>
                 </a:solidFill>
               </a:rPr>
-              <a:t>Between </a:t>
-            </a:r>
-            <a:r>
-              <a:rPr lang="en-US" sz="1000" dirty="0" err="1" smtClean="0">
-                <a:solidFill>
-                  <a:schemeClr val="tx1"/>
-                </a:solidFill>
-              </a:rPr>
-              <a:t>dirs</a:t>
+              <a:t>folders</a:t>
             </a:r>
             <a:endParaRPr lang="en-US" sz="1000" dirty="0" smtClean="0">
               <a:solidFill>
@@ -4878,7 +4902,7 @@
         <p:spPr>
           <a:xfrm>
             <a:off x="381000" y="75168"/>
-            <a:ext cx="4251485" cy="369332"/>
+            <a:ext cx="4046301" cy="369332"/>
           </a:xfrm>
           <a:prstGeom prst="rect">
             <a:avLst/>
@@ -4905,7 +4929,7 @@
                   <a:srgbClr val="0070C0"/>
                 </a:solidFill>
               </a:rPr>
-              <a:t>4.86 </a:t>
+              <a:t>5.1 </a:t>
             </a:r>
             <a:r>
               <a:rPr lang="en-US" b="1" dirty="0" smtClean="0">
@@ -4913,7 +4937,15 @@
                   <a:srgbClr val="0070C0"/>
                 </a:solidFill>
               </a:rPr>
-              <a:t>main functions (18 Jan 2015)</a:t>
+              <a:t>main functions (</a:t>
+            </a:r>
+            <a:r>
+              <a:rPr lang="en-US" b="1" dirty="0" smtClean="0">
+                <a:solidFill>
+                  <a:srgbClr val="0070C0"/>
+                </a:solidFill>
+              </a:rPr>
+              <a:t>1 Oct 2018)</a:t>
             </a:r>
             <a:endParaRPr lang="en-US" b="1" dirty="0">
               <a:solidFill>
@@ -5185,15 +5217,7 @@
                   <a:schemeClr val="tx1"/>
                 </a:solidFill>
               </a:rPr>
-              <a:t>double-click </a:t>
-            </a:r>
-            <a:r>
-              <a:rPr lang="en-US" sz="1000" dirty="0" smtClean="0">
-                <a:solidFill>
-                  <a:schemeClr val="tx1"/>
-                </a:solidFill>
-              </a:rPr>
-              <a:t>on </a:t>
+              <a:t>double-click on </a:t>
             </a:r>
             <a:br>
               <a:rPr lang="en-US" sz="1000" dirty="0" smtClean="0">
@@ -5235,8 +5259,8 @@
               <a:gd name="adj2" fmla="val 1144"/>
               <a:gd name="adj3" fmla="val 47414"/>
               <a:gd name="adj4" fmla="val -11394"/>
-              <a:gd name="adj5" fmla="val -867709"/>
-              <a:gd name="adj6" fmla="val -284037"/>
+              <a:gd name="adj5" fmla="val -860522"/>
+              <a:gd name="adj6" fmla="val -284716"/>
             </a:avLst>
           </a:prstGeom>
           <a:solidFill>
@@ -5302,11 +5326,43 @@
               </a:rPr>
               <a:t> to convert maps</a:t>
             </a:r>
-            <a:endParaRPr lang="en-US" sz="1000" dirty="0" smtClean="0">
-              <a:solidFill>
-                <a:schemeClr val="tx1"/>
-              </a:solidFill>
-            </a:endParaRPr>
+          </a:p>
+        </p:txBody>
+      </p:sp>
+      <p:sp>
+        <p:nvSpPr>
+          <p:cNvPr id="3" name="TextBox 2"/>
+          <p:cNvSpPr txBox="1"/>
+          <p:nvPr/>
+        </p:nvSpPr>
+        <p:spPr>
+          <a:xfrm>
+            <a:off x="6685570" y="2432834"/>
+            <a:ext cx="2182008" cy="246221"/>
+          </a:xfrm>
+          <a:prstGeom prst="rect">
+            <a:avLst/>
+          </a:prstGeom>
+          <a:solidFill>
+            <a:schemeClr val="bg1"/>
+          </a:solidFill>
+          <a:ln>
+            <a:solidFill>
+              <a:schemeClr val="tx1"/>
+            </a:solidFill>
+          </a:ln>
+        </p:spPr>
+        <p:txBody>
+          <a:bodyPr wrap="none" rtlCol="0">
+            <a:spAutoFit/>
+          </a:bodyPr>
+          <a:lstStyle/>
+          <a:p>
+            <a:r>
+              <a:rPr lang="en-US" sz="1000" dirty="0" smtClean="0"/>
+              <a:t>Editor for PCRaster scripts &amp; CMD files</a:t>
+            </a:r>
+            <a:endParaRPr lang="en-US" sz="1000" dirty="0"/>
           </a:p>
         </p:txBody>
       </p:sp>

</xml_diff>